<commit_message>
Mostly done on 02-02-2026
</commit_message>
<xml_diff>
--- a/bi/dashboard.pptx
+++ b/bi/dashboard.pptx
@@ -110,14 +110,6 @@
     </p:ext>
   </p:extLst>
 </p:presentation>
-</file>
-
-<file path=ppt/revisionInfo.xml><?xml version="1.0" encoding="utf-8"?>
-<p1510:revInfo xmlns:a="http://schemas.openxmlformats.org/drawingml/2006/main" xmlns:r="http://schemas.openxmlformats.org/officeDocument/2006/relationships" xmlns:p1510="http://schemas.microsoft.com/office/powerpoint/2015/10/main">
-  <p1510:revLst>
-    <p1510:client id="{4204661E-02F1-407F-BCA6-BB4B92764000}" v="11" dt="2026-02-01T20:49:39.250"/>
-  </p1510:revLst>
-</p1510:revInfo>
 </file>
 
 <file path=ppt/slideLayouts/slideLayout1.xml><?xml version="1.0" encoding="utf-8"?>
@@ -3684,8 +3676,8 @@
         </p:blipFill>
         <p:spPr>
           <a:xfrm>
-            <a:off x="2173610" y="846279"/>
-            <a:ext cx="2218624" cy="2016136"/>
+            <a:off x="2173610" y="839506"/>
+            <a:ext cx="2218624" cy="2022909"/>
           </a:xfrm>
           <a:prstGeom prst="rect">
             <a:avLst/>
@@ -4165,15 +4157,6 @@
 </file>
 
 <file path=customXml/item2.xml><?xml version="1.0" encoding="utf-8"?>
-<?mso-contentType ?>
-<FormTemplates xmlns="http://schemas.microsoft.com/sharepoint/v3/contenttype/forms">
-  <Display>DocumentLibraryForm</Display>
-  <Edit>DocumentLibraryForm</Edit>
-  <New>DocumentLibraryForm</New>
-</FormTemplates>
-</file>
-
-<file path=customXml/item3.xml><?xml version="1.0" encoding="utf-8"?>
 <ct:contentTypeSchema xmlns:ct="http://schemas.microsoft.com/office/2006/metadata/contentType" xmlns:ma="http://schemas.microsoft.com/office/2006/metadata/properties/metaAttributes" ct:_="" ma:_="" ma:contentTypeName="Document" ma:contentTypeID="0x01010038047B9AF98F4845B6C94475DC5A64D9" ma:contentTypeVersion="9" ma:contentTypeDescription="Create a new document." ma:contentTypeScope="" ma:versionID="4ce55d9f0f6a4a98189f59299b3cc1bf">
   <xsd:schema xmlns:xsd="http://www.w3.org/2001/XMLSchema" xmlns:xs="http://www.w3.org/2001/XMLSchema" xmlns:p="http://schemas.microsoft.com/office/2006/metadata/properties" xmlns:ns3="00535f98-5b79-47b1-8f4f-c504002e37cf" xmlns:ns4="433af422-5cc6-4a39-af29-4d2d92169cdb" targetNamespace="http://schemas.microsoft.com/office/2006/metadata/properties" ma:root="true" ma:fieldsID="4c8ffff46261c6672075d07ac15f7e55" ns3:_="" ns4:_="">
     <xsd:import namespace="00535f98-5b79-47b1-8f4f-c504002e37cf"/>
@@ -4368,6 +4351,15 @@
 </ct:contentTypeSchema>
 </file>
 
+<file path=customXml/item3.xml><?xml version="1.0" encoding="utf-8"?>
+<?mso-contentType ?>
+<FormTemplates xmlns="http://schemas.microsoft.com/sharepoint/v3/contenttype/forms">
+  <Display>DocumentLibraryForm</Display>
+  <Edit>DocumentLibraryForm</Edit>
+  <New>DocumentLibraryForm</New>
+</FormTemplates>
+</file>
+
 <file path=customXml/itemProps1.xml><?xml version="1.0" encoding="utf-8"?>
 <ds:datastoreItem xmlns:ds="http://schemas.openxmlformats.org/officeDocument/2006/customXml" ds:itemID="{BD6A3E14-75F3-49B5-A7F5-4E64C783EE25}">
   <ds:schemaRefs>
@@ -4386,14 +4378,6 @@
 </file>
 
 <file path=customXml/itemProps2.xml><?xml version="1.0" encoding="utf-8"?>
-<ds:datastoreItem xmlns:ds="http://schemas.openxmlformats.org/officeDocument/2006/customXml" ds:itemID="{10B8EB2A-65CE-4955-A746-042F8776651B}">
-  <ds:schemaRefs>
-    <ds:schemaRef ds:uri="http://schemas.microsoft.com/sharepoint/v3/contenttype/forms"/>
-  </ds:schemaRefs>
-</ds:datastoreItem>
-</file>
-
-<file path=customXml/itemProps3.xml><?xml version="1.0" encoding="utf-8"?>
 <ds:datastoreItem xmlns:ds="http://schemas.openxmlformats.org/officeDocument/2006/customXml" ds:itemID="{31C69B6B-4D12-48B6-BBF1-81BE218B6970}">
   <ds:schemaRefs>
     <ds:schemaRef ds:uri="http://schemas.microsoft.com/office/2006/metadata/contentType"/>
@@ -4410,4 +4394,12 @@
     <ds:schemaRef ds:uri="http://schemas.microsoft.com/internal/obd"/>
   </ds:schemaRefs>
 </ds:datastoreItem>
+</file>
+
+<file path=customXml/itemProps3.xml><?xml version="1.0" encoding="utf-8"?>
+<ds:datastoreItem xmlns:ds="http://schemas.openxmlformats.org/officeDocument/2006/customXml" ds:itemID="{10B8EB2A-65CE-4955-A746-042F8776651B}">
+  <ds:schemaRefs>
+    <ds:schemaRef ds:uri="http://schemas.microsoft.com/sharepoint/v3/contenttype/forms"/>
+  </ds:schemaRefs>
+</ds:datastoreItem>
 </file>
</xml_diff>